<commit_message>
New post routes and added Css grid
</commit_message>
<xml_diff>
--- a/Overview_routes_dbase.pptx
+++ b/Overview_routes_dbase.pptx
@@ -104,6 +104,11 @@
       </a:defRPr>
     </a:lvl9pPr>
   </p:defaultTextStyle>
+  <p:extLst>
+    <p:ext uri="{EFAFB233-063F-42B5-8137-9DF3F51BA10A}">
+      <p15:sldGuideLst xmlns:p15="http://schemas.microsoft.com/office/powerpoint/2012/main"/>
+    </p:ext>
+  </p:extLst>
 </p:presentation>
 </file>
 
@@ -254,7 +259,7 @@
           <a:p>
             <a:fld id="{1AF7E935-D70E-4DAB-A2FF-69E5E1A26900}" type="datetimeFigureOut">
               <a:rPr lang="nl-NL" smtClean="0"/>
-              <a:t>14-3-2018</a:t>
+              <a:t>16-3-2018</a:t>
             </a:fld>
             <a:endParaRPr lang="nl-NL"/>
           </a:p>
@@ -452,7 +457,7 @@
           <a:p>
             <a:fld id="{1AF7E935-D70E-4DAB-A2FF-69E5E1A26900}" type="datetimeFigureOut">
               <a:rPr lang="nl-NL" smtClean="0"/>
-              <a:t>14-3-2018</a:t>
+              <a:t>16-3-2018</a:t>
             </a:fld>
             <a:endParaRPr lang="nl-NL"/>
           </a:p>
@@ -660,7 +665,7 @@
           <a:p>
             <a:fld id="{1AF7E935-D70E-4DAB-A2FF-69E5E1A26900}" type="datetimeFigureOut">
               <a:rPr lang="nl-NL" smtClean="0"/>
-              <a:t>14-3-2018</a:t>
+              <a:t>16-3-2018</a:t>
             </a:fld>
             <a:endParaRPr lang="nl-NL"/>
           </a:p>
@@ -858,7 +863,7 @@
           <a:p>
             <a:fld id="{1AF7E935-D70E-4DAB-A2FF-69E5E1A26900}" type="datetimeFigureOut">
               <a:rPr lang="nl-NL" smtClean="0"/>
-              <a:t>14-3-2018</a:t>
+              <a:t>16-3-2018</a:t>
             </a:fld>
             <a:endParaRPr lang="nl-NL"/>
           </a:p>
@@ -1133,7 +1138,7 @@
           <a:p>
             <a:fld id="{1AF7E935-D70E-4DAB-A2FF-69E5E1A26900}" type="datetimeFigureOut">
               <a:rPr lang="nl-NL" smtClean="0"/>
-              <a:t>14-3-2018</a:t>
+              <a:t>16-3-2018</a:t>
             </a:fld>
             <a:endParaRPr lang="nl-NL"/>
           </a:p>
@@ -1398,7 +1403,7 @@
           <a:p>
             <a:fld id="{1AF7E935-D70E-4DAB-A2FF-69E5E1A26900}" type="datetimeFigureOut">
               <a:rPr lang="nl-NL" smtClean="0"/>
-              <a:t>14-3-2018</a:t>
+              <a:t>16-3-2018</a:t>
             </a:fld>
             <a:endParaRPr lang="nl-NL"/>
           </a:p>
@@ -1810,7 +1815,7 @@
           <a:p>
             <a:fld id="{1AF7E935-D70E-4DAB-A2FF-69E5E1A26900}" type="datetimeFigureOut">
               <a:rPr lang="nl-NL" smtClean="0"/>
-              <a:t>14-3-2018</a:t>
+              <a:t>16-3-2018</a:t>
             </a:fld>
             <a:endParaRPr lang="nl-NL"/>
           </a:p>
@@ -1951,7 +1956,7 @@
           <a:p>
             <a:fld id="{1AF7E935-D70E-4DAB-A2FF-69E5E1A26900}" type="datetimeFigureOut">
               <a:rPr lang="nl-NL" smtClean="0"/>
-              <a:t>14-3-2018</a:t>
+              <a:t>16-3-2018</a:t>
             </a:fld>
             <a:endParaRPr lang="nl-NL"/>
           </a:p>
@@ -2064,7 +2069,7 @@
           <a:p>
             <a:fld id="{1AF7E935-D70E-4DAB-A2FF-69E5E1A26900}" type="datetimeFigureOut">
               <a:rPr lang="nl-NL" smtClean="0"/>
-              <a:t>14-3-2018</a:t>
+              <a:t>16-3-2018</a:t>
             </a:fld>
             <a:endParaRPr lang="nl-NL"/>
           </a:p>
@@ -2375,7 +2380,7 @@
           <a:p>
             <a:fld id="{1AF7E935-D70E-4DAB-A2FF-69E5E1A26900}" type="datetimeFigureOut">
               <a:rPr lang="nl-NL" smtClean="0"/>
-              <a:t>14-3-2018</a:t>
+              <a:t>16-3-2018</a:t>
             </a:fld>
             <a:endParaRPr lang="nl-NL"/>
           </a:p>
@@ -2663,7 +2668,7 @@
           <a:p>
             <a:fld id="{1AF7E935-D70E-4DAB-A2FF-69E5E1A26900}" type="datetimeFigureOut">
               <a:rPr lang="nl-NL" smtClean="0"/>
-              <a:t>14-3-2018</a:t>
+              <a:t>16-3-2018</a:t>
             </a:fld>
             <a:endParaRPr lang="nl-NL"/>
           </a:p>
@@ -2904,7 +2909,7 @@
           <a:p>
             <a:fld id="{1AF7E935-D70E-4DAB-A2FF-69E5E1A26900}" type="datetimeFigureOut">
               <a:rPr lang="nl-NL" smtClean="0"/>
-              <a:t>14-3-2018</a:t>
+              <a:t>16-3-2018</a:t>
             </a:fld>
             <a:endParaRPr lang="nl-NL"/>
           </a:p>
@@ -3335,8 +3340,8 @@
         </p:nvSpPr>
         <p:spPr>
           <a:xfrm>
-            <a:off x="4634145" y="400236"/>
-            <a:ext cx="1251751" cy="763480"/>
+            <a:off x="5767527" y="567008"/>
+            <a:ext cx="1749641" cy="763480"/>
           </a:xfrm>
           <a:prstGeom prst="rect">
             <a:avLst/>
@@ -3392,8 +3397,8 @@
         </p:nvSpPr>
         <p:spPr>
           <a:xfrm>
-            <a:off x="1959745" y="1695637"/>
-            <a:ext cx="1251751" cy="763480"/>
+            <a:off x="5767527" y="1794961"/>
+            <a:ext cx="1749641" cy="763480"/>
           </a:xfrm>
           <a:prstGeom prst="rect">
             <a:avLst/>
@@ -3449,7 +3454,7 @@
         </p:nvSpPr>
         <p:spPr>
           <a:xfrm>
-            <a:off x="4372992" y="1695637"/>
+            <a:off x="5767527" y="3047260"/>
             <a:ext cx="1774056" cy="763480"/>
           </a:xfrm>
           <a:prstGeom prst="rect">
@@ -3514,8 +3519,8 @@
         </p:nvSpPr>
         <p:spPr>
           <a:xfrm>
-            <a:off x="7308544" y="1695637"/>
-            <a:ext cx="1251751" cy="763480"/>
+            <a:off x="5767527" y="4299559"/>
+            <a:ext cx="1774056" cy="763480"/>
           </a:xfrm>
           <a:prstGeom prst="rect">
             <a:avLst/>
@@ -3571,8 +3576,8 @@
         </p:nvSpPr>
         <p:spPr>
           <a:xfrm>
-            <a:off x="1437440" y="3335040"/>
-            <a:ext cx="1774056" cy="763480"/>
+            <a:off x="239697" y="1807134"/>
+            <a:ext cx="1749641" cy="751307"/>
           </a:xfrm>
           <a:prstGeom prst="rect">
             <a:avLst/>
@@ -3632,7 +3637,7 @@
         </p:nvSpPr>
         <p:spPr>
           <a:xfrm>
-            <a:off x="3928367" y="3335040"/>
+            <a:off x="227489" y="608404"/>
             <a:ext cx="1774056" cy="763480"/>
           </a:xfrm>
           <a:prstGeom prst="rect">
@@ -3693,7 +3698,7 @@
         </p:nvSpPr>
         <p:spPr>
           <a:xfrm>
-            <a:off x="4523171" y="5162363"/>
+            <a:off x="2818104" y="5610266"/>
             <a:ext cx="1774056" cy="763480"/>
           </a:xfrm>
           <a:prstGeom prst="rect">
@@ -3746,10 +3751,10 @@
       </p:sp>
       <p:sp>
         <p:nvSpPr>
-          <p:cNvPr id="11" name="Rechthoek 10">
-            <a:extLst>
-              <a:ext uri="{FF2B5EF4-FFF2-40B4-BE49-F238E27FC236}">
-                <a16:creationId xmlns:a16="http://schemas.microsoft.com/office/drawing/2014/main" id="{962A542B-4C82-46D4-BA61-76160095F5CC}"/>
+          <p:cNvPr id="12" name="Rechthoek 11">
+            <a:extLst>
+              <a:ext uri="{FF2B5EF4-FFF2-40B4-BE49-F238E27FC236}">
+                <a16:creationId xmlns:a16="http://schemas.microsoft.com/office/drawing/2014/main" id="{5F85FDE5-DE67-45EB-AAAF-C2A3F705679C}"/>
               </a:ext>
             </a:extLst>
           </p:cNvPr>
@@ -3758,7 +3763,7 @@
         </p:nvSpPr>
         <p:spPr>
           <a:xfrm>
-            <a:off x="9851256" y="1017968"/>
+            <a:off x="215282" y="3071794"/>
             <a:ext cx="1774056" cy="763480"/>
           </a:xfrm>
           <a:prstGeom prst="rect">
@@ -3800,17 +3805,112 @@
             </a:r>
             <a:r>
               <a:rPr lang="nl-NL" dirty="0"/>
-              <a:t> users</a:t>
-            </a:r>
-          </a:p>
-        </p:txBody>
-      </p:sp>
-      <p:sp>
-        <p:nvSpPr>
-          <p:cNvPr id="12" name="Rechthoek 11">
-            <a:extLst>
-              <a:ext uri="{FF2B5EF4-FFF2-40B4-BE49-F238E27FC236}">
-                <a16:creationId xmlns:a16="http://schemas.microsoft.com/office/drawing/2014/main" id="{5F85FDE5-DE67-45EB-AAAF-C2A3F705679C}"/>
+              <a:t> </a:t>
+            </a:r>
+            <a:r>
+              <a:rPr lang="nl-NL" dirty="0" err="1"/>
+              <a:t>maps</a:t>
+            </a:r>
+            <a:endParaRPr lang="nl-NL" dirty="0"/>
+          </a:p>
+        </p:txBody>
+      </p:sp>
+      <p:sp>
+        <p:nvSpPr>
+          <p:cNvPr id="2" name="Tekstvak 1">
+            <a:extLst>
+              <a:ext uri="{FF2B5EF4-FFF2-40B4-BE49-F238E27FC236}">
+                <a16:creationId xmlns:a16="http://schemas.microsoft.com/office/drawing/2014/main" id="{A2595379-21BF-4E97-9A54-475C9E81B23F}"/>
+              </a:ext>
+            </a:extLst>
+          </p:cNvPr>
+          <p:cNvSpPr txBox="1"/>
+          <p:nvPr/>
+        </p:nvSpPr>
+        <p:spPr>
+          <a:xfrm>
+            <a:off x="5990209" y="197676"/>
+            <a:ext cx="1526959" cy="369332"/>
+          </a:xfrm>
+          <a:prstGeom prst="rect">
+            <a:avLst/>
+          </a:prstGeom>
+          <a:noFill/>
+        </p:spPr>
+        <p:txBody>
+          <a:bodyPr wrap="square" rtlCol="0">
+            <a:spAutoFit/>
+          </a:bodyPr>
+          <a:lstStyle/>
+          <a:p>
+            <a:r>
+              <a:rPr lang="nl-NL" dirty="0"/>
+              <a:t>Homepage</a:t>
+            </a:r>
+          </a:p>
+        </p:txBody>
+      </p:sp>
+      <p:sp>
+        <p:nvSpPr>
+          <p:cNvPr id="3" name="Tekstvak 2">
+            <a:extLst>
+              <a:ext uri="{FF2B5EF4-FFF2-40B4-BE49-F238E27FC236}">
+                <a16:creationId xmlns:a16="http://schemas.microsoft.com/office/drawing/2014/main" id="{3E0D7860-DB17-4A4A-8BA1-52A28F210D93}"/>
+              </a:ext>
+            </a:extLst>
+          </p:cNvPr>
+          <p:cNvSpPr txBox="1"/>
+          <p:nvPr/>
+        </p:nvSpPr>
+        <p:spPr>
+          <a:xfrm>
+            <a:off x="9065583" y="197676"/>
+            <a:ext cx="3548847" cy="369332"/>
+          </a:xfrm>
+          <a:prstGeom prst="rect">
+            <a:avLst/>
+          </a:prstGeom>
+          <a:noFill/>
+        </p:spPr>
+        <p:txBody>
+          <a:bodyPr wrap="square" rtlCol="0">
+            <a:spAutoFit/>
+          </a:bodyPr>
+          <a:lstStyle/>
+          <a:p>
+            <a:r>
+              <a:rPr lang="nl-NL" dirty="0" err="1"/>
+              <a:t>External</a:t>
+            </a:r>
+            <a:r>
+              <a:rPr lang="nl-NL" dirty="0"/>
+              <a:t> links </a:t>
+            </a:r>
+            <a:r>
+              <a:rPr lang="nl-NL" dirty="0" err="1"/>
+              <a:t>to</a:t>
+            </a:r>
+            <a:r>
+              <a:rPr lang="nl-NL" dirty="0"/>
+              <a:t> </a:t>
+            </a:r>
+            <a:r>
+              <a:rPr lang="nl-NL" dirty="0" err="1"/>
+              <a:t>social</a:t>
+            </a:r>
+            <a:r>
+              <a:rPr lang="nl-NL" dirty="0"/>
+              <a:t> media:</a:t>
+            </a:r>
+          </a:p>
+        </p:txBody>
+      </p:sp>
+      <p:sp>
+        <p:nvSpPr>
+          <p:cNvPr id="13" name="Ovaal 12">
+            <a:extLst>
+              <a:ext uri="{FF2B5EF4-FFF2-40B4-BE49-F238E27FC236}">
+                <a16:creationId xmlns:a16="http://schemas.microsoft.com/office/drawing/2014/main" id="{BA3F0B09-36DE-4F8A-9BB2-CE2EC9306EF4}"/>
               </a:ext>
             </a:extLst>
           </p:cNvPr>
@@ -3819,10 +3919,10 @@
         </p:nvSpPr>
         <p:spPr>
           <a:xfrm>
-            <a:off x="6312764" y="3349831"/>
-            <a:ext cx="1774056" cy="763480"/>
-          </a:xfrm>
-          <a:prstGeom prst="rect">
+            <a:off x="9787080" y="657614"/>
+            <a:ext cx="1597609" cy="600023"/>
+          </a:xfrm>
+          <a:prstGeom prst="ellipse">
             <a:avLst/>
           </a:prstGeom>
         </p:spPr>
@@ -3849,25 +3949,738 @@
             <a:pPr algn="ctr"/>
             <a:r>
               <a:rPr lang="nl-NL" dirty="0" err="1"/>
-              <a:t>Dbase</a:t>
-            </a:r>
+              <a:t>Linkedin</a:t>
+            </a:r>
+            <a:endParaRPr lang="nl-NL" dirty="0"/>
+          </a:p>
+        </p:txBody>
+      </p:sp>
+      <p:sp>
+        <p:nvSpPr>
+          <p:cNvPr id="14" name="Ovaal 13">
+            <a:extLst>
+              <a:ext uri="{FF2B5EF4-FFF2-40B4-BE49-F238E27FC236}">
+                <a16:creationId xmlns:a16="http://schemas.microsoft.com/office/drawing/2014/main" id="{52AF784A-F0B8-42C1-A09D-E54B826EDEB6}"/>
+              </a:ext>
+            </a:extLst>
+          </p:cNvPr>
+          <p:cNvSpPr/>
+          <p:nvPr/>
+        </p:nvSpPr>
+        <p:spPr>
+          <a:xfrm>
+            <a:off x="9788189" y="1339365"/>
+            <a:ext cx="1597609" cy="600023"/>
+          </a:xfrm>
+          <a:prstGeom prst="ellipse">
+            <a:avLst/>
+          </a:prstGeom>
+        </p:spPr>
+        <p:style>
+          <a:lnRef idx="2">
+            <a:schemeClr val="accent1">
+              <a:shade val="50000"/>
+            </a:schemeClr>
+          </a:lnRef>
+          <a:fillRef idx="1">
+            <a:schemeClr val="accent1"/>
+          </a:fillRef>
+          <a:effectRef idx="0">
+            <a:schemeClr val="accent1"/>
+          </a:effectRef>
+          <a:fontRef idx="minor">
+            <a:schemeClr val="lt1"/>
+          </a:fontRef>
+        </p:style>
+        <p:txBody>
+          <a:bodyPr rtlCol="0" anchor="ctr"/>
+          <a:lstStyle/>
+          <a:p>
+            <a:pPr algn="ctr"/>
             <a:r>
               <a:rPr lang="nl-NL" dirty="0"/>
-              <a:t> </a:t>
-            </a:r>
+              <a:t>Facebook</a:t>
+            </a:r>
+          </a:p>
+        </p:txBody>
+      </p:sp>
+      <p:sp>
+        <p:nvSpPr>
+          <p:cNvPr id="15" name="Ovaal 14">
+            <a:extLst>
+              <a:ext uri="{FF2B5EF4-FFF2-40B4-BE49-F238E27FC236}">
+                <a16:creationId xmlns:a16="http://schemas.microsoft.com/office/drawing/2014/main" id="{84B9712D-3B56-4444-BD59-EC7083B5044C}"/>
+              </a:ext>
+            </a:extLst>
+          </p:cNvPr>
+          <p:cNvSpPr/>
+          <p:nvPr/>
+        </p:nvSpPr>
+        <p:spPr>
+          <a:xfrm>
+            <a:off x="9787080" y="2046094"/>
+            <a:ext cx="1597608" cy="600023"/>
+          </a:xfrm>
+          <a:prstGeom prst="ellipse">
+            <a:avLst/>
+          </a:prstGeom>
+        </p:spPr>
+        <p:style>
+          <a:lnRef idx="2">
+            <a:schemeClr val="accent1">
+              <a:shade val="50000"/>
+            </a:schemeClr>
+          </a:lnRef>
+          <a:fillRef idx="1">
+            <a:schemeClr val="accent1"/>
+          </a:fillRef>
+          <a:effectRef idx="0">
+            <a:schemeClr val="accent1"/>
+          </a:effectRef>
+          <a:fontRef idx="minor">
+            <a:schemeClr val="lt1"/>
+          </a:fontRef>
+        </p:style>
+        <p:txBody>
+          <a:bodyPr rtlCol="0" anchor="ctr"/>
+          <a:lstStyle/>
+          <a:p>
+            <a:pPr algn="ctr"/>
+            <a:r>
+              <a:rPr lang="nl-NL" dirty="0"/>
+              <a:t>GitHub</a:t>
+            </a:r>
+          </a:p>
+        </p:txBody>
+      </p:sp>
+      <p:cxnSp>
+        <p:nvCxnSpPr>
+          <p:cNvPr id="17" name="Rechte verbindingslijn met pijl 16">
+            <a:extLst>
+              <a:ext uri="{FF2B5EF4-FFF2-40B4-BE49-F238E27FC236}">
+                <a16:creationId xmlns:a16="http://schemas.microsoft.com/office/drawing/2014/main" id="{1C207755-EC82-4F29-BC61-7E1FE0913600}"/>
+              </a:ext>
+            </a:extLst>
+          </p:cNvPr>
+          <p:cNvCxnSpPr/>
+          <p:nvPr/>
+        </p:nvCxnSpPr>
+        <p:spPr>
+          <a:xfrm>
+            <a:off x="7669569" y="913063"/>
+            <a:ext cx="2015231" cy="0"/>
+          </a:xfrm>
+          <a:prstGeom prst="straightConnector1">
+            <a:avLst/>
+          </a:prstGeom>
+          <a:ln>
+            <a:tailEnd type="triangle"/>
+          </a:ln>
+        </p:spPr>
+        <p:style>
+          <a:lnRef idx="1">
+            <a:schemeClr val="accent1"/>
+          </a:lnRef>
+          <a:fillRef idx="0">
+            <a:schemeClr val="accent1"/>
+          </a:fillRef>
+          <a:effectRef idx="0">
+            <a:schemeClr val="accent1"/>
+          </a:effectRef>
+          <a:fontRef idx="minor">
+            <a:schemeClr val="tx1"/>
+          </a:fontRef>
+        </p:style>
+      </p:cxnSp>
+      <p:cxnSp>
+        <p:nvCxnSpPr>
+          <p:cNvPr id="19" name="Rechte verbindingslijn met pijl 18">
+            <a:extLst>
+              <a:ext uri="{FF2B5EF4-FFF2-40B4-BE49-F238E27FC236}">
+                <a16:creationId xmlns:a16="http://schemas.microsoft.com/office/drawing/2014/main" id="{48CADFCB-74ED-4C5F-98F4-16AFDEC8F71C}"/>
+              </a:ext>
+            </a:extLst>
+          </p:cNvPr>
+          <p:cNvCxnSpPr/>
+          <p:nvPr/>
+        </p:nvCxnSpPr>
+        <p:spPr>
+          <a:xfrm>
+            <a:off x="7687324" y="948573"/>
+            <a:ext cx="2099756" cy="656948"/>
+          </a:xfrm>
+          <a:prstGeom prst="straightConnector1">
+            <a:avLst/>
+          </a:prstGeom>
+          <a:ln>
+            <a:tailEnd type="triangle"/>
+          </a:ln>
+        </p:spPr>
+        <p:style>
+          <a:lnRef idx="1">
+            <a:schemeClr val="accent1"/>
+          </a:lnRef>
+          <a:fillRef idx="0">
+            <a:schemeClr val="accent1"/>
+          </a:fillRef>
+          <a:effectRef idx="0">
+            <a:schemeClr val="accent1"/>
+          </a:effectRef>
+          <a:fontRef idx="minor">
+            <a:schemeClr val="tx1"/>
+          </a:fontRef>
+        </p:style>
+      </p:cxnSp>
+      <p:cxnSp>
+        <p:nvCxnSpPr>
+          <p:cNvPr id="21" name="Rechte verbindingslijn met pijl 20">
+            <a:extLst>
+              <a:ext uri="{FF2B5EF4-FFF2-40B4-BE49-F238E27FC236}">
+                <a16:creationId xmlns:a16="http://schemas.microsoft.com/office/drawing/2014/main" id="{84CAD248-3DE8-4B10-9EEA-30FB231474CC}"/>
+              </a:ext>
+            </a:extLst>
+          </p:cNvPr>
+          <p:cNvCxnSpPr/>
+          <p:nvPr/>
+        </p:nvCxnSpPr>
+        <p:spPr>
+          <a:xfrm>
+            <a:off x="7669569" y="967455"/>
+            <a:ext cx="2015231" cy="1388480"/>
+          </a:xfrm>
+          <a:prstGeom prst="straightConnector1">
+            <a:avLst/>
+          </a:prstGeom>
+          <a:ln>
+            <a:tailEnd type="triangle"/>
+          </a:ln>
+        </p:spPr>
+        <p:style>
+          <a:lnRef idx="1">
+            <a:schemeClr val="accent1"/>
+          </a:lnRef>
+          <a:fillRef idx="0">
+            <a:schemeClr val="accent1"/>
+          </a:fillRef>
+          <a:effectRef idx="0">
+            <a:schemeClr val="accent1"/>
+          </a:effectRef>
+          <a:fontRef idx="minor">
+            <a:schemeClr val="tx1"/>
+          </a:fontRef>
+        </p:style>
+      </p:cxnSp>
+      <p:sp>
+        <p:nvSpPr>
+          <p:cNvPr id="22" name="Tekstvak 21">
+            <a:extLst>
+              <a:ext uri="{FF2B5EF4-FFF2-40B4-BE49-F238E27FC236}">
+                <a16:creationId xmlns:a16="http://schemas.microsoft.com/office/drawing/2014/main" id="{A49AAA15-015E-4175-9E6A-B4CF5CDC8CEC}"/>
+              </a:ext>
+            </a:extLst>
+          </p:cNvPr>
+          <p:cNvSpPr txBox="1"/>
+          <p:nvPr/>
+        </p:nvSpPr>
+        <p:spPr>
+          <a:xfrm>
+            <a:off x="5878867" y="1437802"/>
+            <a:ext cx="1526959" cy="369332"/>
+          </a:xfrm>
+          <a:prstGeom prst="rect">
+            <a:avLst/>
+          </a:prstGeom>
+          <a:noFill/>
+        </p:spPr>
+        <p:txBody>
+          <a:bodyPr wrap="square" rtlCol="0">
+            <a:spAutoFit/>
+          </a:bodyPr>
+          <a:lstStyle/>
+          <a:p>
             <a:r>
               <a:rPr lang="nl-NL" dirty="0" err="1"/>
-              <a:t>table</a:t>
+              <a:t>All</a:t>
             </a:r>
             <a:r>
               <a:rPr lang="nl-NL" dirty="0"/>
-              <a:t> </a:t>
-            </a:r>
+              <a:t> tracks page</a:t>
+            </a:r>
+          </a:p>
+        </p:txBody>
+      </p:sp>
+      <p:sp>
+        <p:nvSpPr>
+          <p:cNvPr id="23" name="Tekstvak 22">
+            <a:extLst>
+              <a:ext uri="{FF2B5EF4-FFF2-40B4-BE49-F238E27FC236}">
+                <a16:creationId xmlns:a16="http://schemas.microsoft.com/office/drawing/2014/main" id="{006C86CE-F047-4C6E-8FE0-D2CBBC986BC1}"/>
+              </a:ext>
+            </a:extLst>
+          </p:cNvPr>
+          <p:cNvSpPr txBox="1"/>
+          <p:nvPr/>
+        </p:nvSpPr>
+        <p:spPr>
+          <a:xfrm>
+            <a:off x="5791942" y="2702462"/>
+            <a:ext cx="1749641" cy="369332"/>
+          </a:xfrm>
+          <a:prstGeom prst="rect">
+            <a:avLst/>
+          </a:prstGeom>
+          <a:noFill/>
+        </p:spPr>
+        <p:txBody>
+          <a:bodyPr wrap="square" rtlCol="0">
+            <a:spAutoFit/>
+          </a:bodyPr>
+          <a:lstStyle/>
+          <a:p>
             <a:r>
               <a:rPr lang="nl-NL" dirty="0" err="1"/>
-              <a:t>maps</a:t>
+              <a:t>One</a:t>
+            </a:r>
+            <a:r>
+              <a:rPr lang="nl-NL" dirty="0"/>
+              <a:t> track page</a:t>
+            </a:r>
+          </a:p>
+        </p:txBody>
+      </p:sp>
+      <p:sp>
+        <p:nvSpPr>
+          <p:cNvPr id="24" name="Tekstvak 23">
+            <a:extLst>
+              <a:ext uri="{FF2B5EF4-FFF2-40B4-BE49-F238E27FC236}">
+                <a16:creationId xmlns:a16="http://schemas.microsoft.com/office/drawing/2014/main" id="{923BA08D-9180-43A6-8371-7800A4AFC182}"/>
+              </a:ext>
+            </a:extLst>
+          </p:cNvPr>
+          <p:cNvSpPr txBox="1"/>
+          <p:nvPr/>
+        </p:nvSpPr>
+        <p:spPr>
+          <a:xfrm>
+            <a:off x="5919928" y="3910064"/>
+            <a:ext cx="1749641" cy="369332"/>
+          </a:xfrm>
+          <a:prstGeom prst="rect">
+            <a:avLst/>
+          </a:prstGeom>
+          <a:noFill/>
+        </p:spPr>
+        <p:txBody>
+          <a:bodyPr wrap="square" rtlCol="0">
+            <a:spAutoFit/>
+          </a:bodyPr>
+          <a:lstStyle/>
+          <a:p>
+            <a:r>
+              <a:rPr lang="nl-NL" dirty="0"/>
+              <a:t>Map page</a:t>
+            </a:r>
+          </a:p>
+        </p:txBody>
+      </p:sp>
+      <p:sp>
+        <p:nvSpPr>
+          <p:cNvPr id="25" name="Rechthoek 24">
+            <a:extLst>
+              <a:ext uri="{FF2B5EF4-FFF2-40B4-BE49-F238E27FC236}">
+                <a16:creationId xmlns:a16="http://schemas.microsoft.com/office/drawing/2014/main" id="{5F8D0032-E1FB-48C7-BF4A-F7172384BD81}"/>
+              </a:ext>
+            </a:extLst>
+          </p:cNvPr>
+          <p:cNvSpPr/>
+          <p:nvPr/>
+        </p:nvSpPr>
+        <p:spPr>
+          <a:xfrm>
+            <a:off x="5779734" y="5591979"/>
+            <a:ext cx="1774056" cy="763480"/>
+          </a:xfrm>
+          <a:prstGeom prst="rect">
+            <a:avLst/>
+          </a:prstGeom>
+        </p:spPr>
+        <p:style>
+          <a:lnRef idx="2">
+            <a:schemeClr val="accent1">
+              <a:shade val="50000"/>
+            </a:schemeClr>
+          </a:lnRef>
+          <a:fillRef idx="1">
+            <a:schemeClr val="accent1"/>
+          </a:fillRef>
+          <a:effectRef idx="0">
+            <a:schemeClr val="accent1"/>
+          </a:effectRef>
+          <a:fontRef idx="minor">
+            <a:schemeClr val="lt1"/>
+          </a:fontRef>
+        </p:style>
+        <p:txBody>
+          <a:bodyPr rtlCol="0" anchor="ctr"/>
+          <a:lstStyle/>
+          <a:p>
+            <a:pPr algn="ctr"/>
+            <a:r>
+              <a:rPr lang="nl-NL" dirty="0" err="1"/>
+              <a:t>Server.get</a:t>
             </a:r>
             <a:endParaRPr lang="nl-NL" dirty="0"/>
+          </a:p>
+          <a:p>
+            <a:pPr algn="ctr"/>
+            <a:r>
+              <a:rPr lang="nl-NL" dirty="0"/>
+              <a:t>‘/</a:t>
+            </a:r>
+            <a:r>
+              <a:rPr lang="nl-NL" dirty="0" err="1"/>
+              <a:t>addtrack</a:t>
+            </a:r>
+            <a:r>
+              <a:rPr lang="nl-NL" dirty="0"/>
+              <a:t>’</a:t>
+            </a:r>
+          </a:p>
+        </p:txBody>
+      </p:sp>
+      <p:sp>
+        <p:nvSpPr>
+          <p:cNvPr id="26" name="Tekstvak 25">
+            <a:extLst>
+              <a:ext uri="{FF2B5EF4-FFF2-40B4-BE49-F238E27FC236}">
+                <a16:creationId xmlns:a16="http://schemas.microsoft.com/office/drawing/2014/main" id="{46F8E681-6F32-4D3C-B3A9-3385B10BAFB4}"/>
+              </a:ext>
+            </a:extLst>
+          </p:cNvPr>
+          <p:cNvSpPr txBox="1"/>
+          <p:nvPr/>
+        </p:nvSpPr>
+        <p:spPr>
+          <a:xfrm>
+            <a:off x="5779734" y="5142843"/>
+            <a:ext cx="1749641" cy="369332"/>
+          </a:xfrm>
+          <a:prstGeom prst="rect">
+            <a:avLst/>
+          </a:prstGeom>
+          <a:noFill/>
+        </p:spPr>
+        <p:txBody>
+          <a:bodyPr wrap="square" rtlCol="0">
+            <a:spAutoFit/>
+          </a:bodyPr>
+          <a:lstStyle/>
+          <a:p>
+            <a:r>
+              <a:rPr lang="nl-NL" dirty="0" err="1"/>
+              <a:t>Add</a:t>
+            </a:r>
+            <a:r>
+              <a:rPr lang="nl-NL" dirty="0"/>
+              <a:t> track page</a:t>
+            </a:r>
+          </a:p>
+        </p:txBody>
+      </p:sp>
+      <p:cxnSp>
+        <p:nvCxnSpPr>
+          <p:cNvPr id="28" name="Rechte verbindingslijn met pijl 27">
+            <a:extLst>
+              <a:ext uri="{FF2B5EF4-FFF2-40B4-BE49-F238E27FC236}">
+                <a16:creationId xmlns:a16="http://schemas.microsoft.com/office/drawing/2014/main" id="{C3F36B45-9E60-4DE2-B9F2-848168292D81}"/>
+              </a:ext>
+            </a:extLst>
+          </p:cNvPr>
+          <p:cNvCxnSpPr/>
+          <p:nvPr/>
+        </p:nvCxnSpPr>
+        <p:spPr>
+          <a:xfrm>
+            <a:off x="2173551" y="2166151"/>
+            <a:ext cx="3490587" cy="0"/>
+          </a:xfrm>
+          <a:prstGeom prst="straightConnector1">
+            <a:avLst/>
+          </a:prstGeom>
+          <a:ln>
+            <a:tailEnd type="triangle"/>
+          </a:ln>
+        </p:spPr>
+        <p:style>
+          <a:lnRef idx="1">
+            <a:schemeClr val="accent1"/>
+          </a:lnRef>
+          <a:fillRef idx="0">
+            <a:schemeClr val="accent1"/>
+          </a:fillRef>
+          <a:effectRef idx="0">
+            <a:schemeClr val="accent1"/>
+          </a:effectRef>
+          <a:fontRef idx="minor">
+            <a:schemeClr val="tx1"/>
+          </a:fontRef>
+        </p:style>
+      </p:cxnSp>
+      <p:cxnSp>
+        <p:nvCxnSpPr>
+          <p:cNvPr id="30" name="Rechte verbindingslijn met pijl 29">
+            <a:extLst>
+              <a:ext uri="{FF2B5EF4-FFF2-40B4-BE49-F238E27FC236}">
+                <a16:creationId xmlns:a16="http://schemas.microsoft.com/office/drawing/2014/main" id="{F5F6F781-93CC-4E7F-A000-3E85E2E1FEF6}"/>
+              </a:ext>
+            </a:extLst>
+          </p:cNvPr>
+          <p:cNvCxnSpPr/>
+          <p:nvPr/>
+        </p:nvCxnSpPr>
+        <p:spPr>
+          <a:xfrm>
+            <a:off x="2173551" y="2166151"/>
+            <a:ext cx="3490587" cy="1262849"/>
+          </a:xfrm>
+          <a:prstGeom prst="straightConnector1">
+            <a:avLst/>
+          </a:prstGeom>
+          <a:ln>
+            <a:tailEnd type="triangle"/>
+          </a:ln>
+        </p:spPr>
+        <p:style>
+          <a:lnRef idx="1">
+            <a:schemeClr val="accent1"/>
+          </a:lnRef>
+          <a:fillRef idx="0">
+            <a:schemeClr val="accent1"/>
+          </a:fillRef>
+          <a:effectRef idx="0">
+            <a:schemeClr val="accent1"/>
+          </a:effectRef>
+          <a:fontRef idx="minor">
+            <a:schemeClr val="tx1"/>
+          </a:fontRef>
+        </p:style>
+      </p:cxnSp>
+      <p:sp>
+        <p:nvSpPr>
+          <p:cNvPr id="31" name="Tekstvak 30">
+            <a:extLst>
+              <a:ext uri="{FF2B5EF4-FFF2-40B4-BE49-F238E27FC236}">
+                <a16:creationId xmlns:a16="http://schemas.microsoft.com/office/drawing/2014/main" id="{FFB399C4-A0DC-4B89-8595-49D9FE90C891}"/>
+              </a:ext>
+            </a:extLst>
+          </p:cNvPr>
+          <p:cNvSpPr txBox="1"/>
+          <p:nvPr/>
+        </p:nvSpPr>
+        <p:spPr>
+          <a:xfrm>
+            <a:off x="3089614" y="2797575"/>
+            <a:ext cx="1999787" cy="276999"/>
+          </a:xfrm>
+          <a:prstGeom prst="rect">
+            <a:avLst/>
+          </a:prstGeom>
+          <a:solidFill>
+            <a:schemeClr val="bg2"/>
+          </a:solidFill>
+        </p:spPr>
+        <p:txBody>
+          <a:bodyPr wrap="square" rtlCol="0">
+            <a:spAutoFit/>
+          </a:bodyPr>
+          <a:lstStyle/>
+          <a:p>
+            <a:r>
+              <a:rPr lang="nl-NL" sz="1200" dirty="0" err="1"/>
+              <a:t>req.params.trackID</a:t>
+            </a:r>
+            <a:endParaRPr lang="nl-NL" sz="1200" dirty="0"/>
+          </a:p>
+        </p:txBody>
+      </p:sp>
+      <p:cxnSp>
+        <p:nvCxnSpPr>
+          <p:cNvPr id="33" name="Rechte verbindingslijn met pijl 32">
+            <a:extLst>
+              <a:ext uri="{FF2B5EF4-FFF2-40B4-BE49-F238E27FC236}">
+                <a16:creationId xmlns:a16="http://schemas.microsoft.com/office/drawing/2014/main" id="{AEACB953-D58E-4A0E-A119-3726585E385D}"/>
+              </a:ext>
+            </a:extLst>
+          </p:cNvPr>
+          <p:cNvCxnSpPr>
+            <a:cxnSpLocks/>
+          </p:cNvCxnSpPr>
+          <p:nvPr/>
+        </p:nvCxnSpPr>
+        <p:spPr>
+          <a:xfrm flipH="1">
+            <a:off x="4758431" y="5973719"/>
+            <a:ext cx="905708" cy="0"/>
+          </a:xfrm>
+          <a:prstGeom prst="straightConnector1">
+            <a:avLst/>
+          </a:prstGeom>
+          <a:ln>
+            <a:tailEnd type="triangle"/>
+          </a:ln>
+        </p:spPr>
+        <p:style>
+          <a:lnRef idx="1">
+            <a:schemeClr val="accent1"/>
+          </a:lnRef>
+          <a:fillRef idx="0">
+            <a:schemeClr val="accent1"/>
+          </a:fillRef>
+          <a:effectRef idx="0">
+            <a:schemeClr val="accent1"/>
+          </a:effectRef>
+          <a:fontRef idx="minor">
+            <a:schemeClr val="tx1"/>
+          </a:fontRef>
+        </p:style>
+      </p:cxnSp>
+      <p:sp>
+        <p:nvSpPr>
+          <p:cNvPr id="35" name="Tekstvak 34">
+            <a:extLst>
+              <a:ext uri="{FF2B5EF4-FFF2-40B4-BE49-F238E27FC236}">
+                <a16:creationId xmlns:a16="http://schemas.microsoft.com/office/drawing/2014/main" id="{276BCC11-890C-4D5F-BB6B-72C8EA6B3A7A}"/>
+              </a:ext>
+            </a:extLst>
+          </p:cNvPr>
+          <p:cNvSpPr txBox="1"/>
+          <p:nvPr/>
+        </p:nvSpPr>
+        <p:spPr>
+          <a:xfrm>
+            <a:off x="4882718" y="6004414"/>
+            <a:ext cx="692459" cy="369332"/>
+          </a:xfrm>
+          <a:prstGeom prst="rect">
+            <a:avLst/>
+          </a:prstGeom>
+          <a:noFill/>
+        </p:spPr>
+        <p:txBody>
+          <a:bodyPr wrap="square" rtlCol="0">
+            <a:spAutoFit/>
+          </a:bodyPr>
+          <a:lstStyle/>
+          <a:p>
+            <a:r>
+              <a:rPr lang="nl-NL" dirty="0"/>
+              <a:t>form</a:t>
+            </a:r>
+          </a:p>
+        </p:txBody>
+      </p:sp>
+      <p:cxnSp>
+        <p:nvCxnSpPr>
+          <p:cNvPr id="37" name="Rechte verbindingslijn met pijl 36">
+            <a:extLst>
+              <a:ext uri="{FF2B5EF4-FFF2-40B4-BE49-F238E27FC236}">
+                <a16:creationId xmlns:a16="http://schemas.microsoft.com/office/drawing/2014/main" id="{C2F50E15-E17A-4E0E-A29E-ABDE01C249BE}"/>
+              </a:ext>
+            </a:extLst>
+          </p:cNvPr>
+          <p:cNvCxnSpPr/>
+          <p:nvPr/>
+        </p:nvCxnSpPr>
+        <p:spPr>
+          <a:xfrm flipH="1" flipV="1">
+            <a:off x="2068497" y="2346105"/>
+            <a:ext cx="1636635" cy="3166070"/>
+          </a:xfrm>
+          <a:prstGeom prst="straightConnector1">
+            <a:avLst/>
+          </a:prstGeom>
+          <a:ln>
+            <a:tailEnd type="triangle"/>
+          </a:ln>
+        </p:spPr>
+        <p:style>
+          <a:lnRef idx="1">
+            <a:schemeClr val="accent1"/>
+          </a:lnRef>
+          <a:fillRef idx="0">
+            <a:schemeClr val="accent1"/>
+          </a:fillRef>
+          <a:effectRef idx="0">
+            <a:schemeClr val="accent1"/>
+          </a:effectRef>
+          <a:fontRef idx="minor">
+            <a:schemeClr val="tx1"/>
+          </a:fontRef>
+        </p:style>
+      </p:cxnSp>
+      <p:sp>
+        <p:nvSpPr>
+          <p:cNvPr id="38" name="Rechthoek 37">
+            <a:extLst>
+              <a:ext uri="{FF2B5EF4-FFF2-40B4-BE49-F238E27FC236}">
+                <a16:creationId xmlns:a16="http://schemas.microsoft.com/office/drawing/2014/main" id="{D35F2821-EC98-4169-82B5-2F6CA69A7A8F}"/>
+              </a:ext>
+            </a:extLst>
+          </p:cNvPr>
+          <p:cNvSpPr/>
+          <p:nvPr/>
+        </p:nvSpPr>
+        <p:spPr>
+          <a:xfrm>
+            <a:off x="2251968" y="4513104"/>
+            <a:ext cx="2630750" cy="646331"/>
+          </a:xfrm>
+          <a:prstGeom prst="rect">
+            <a:avLst/>
+          </a:prstGeom>
+          <a:solidFill>
+            <a:schemeClr val="bg2"/>
+          </a:solidFill>
+        </p:spPr>
+        <p:txBody>
+          <a:bodyPr wrap="square">
+            <a:spAutoFit/>
+          </a:bodyPr>
+          <a:lstStyle/>
+          <a:p>
+            <a:r>
+              <a:rPr lang="en-US" sz="1200" dirty="0" err="1"/>
+              <a:t>const</a:t>
+            </a:r>
+            <a:r>
+              <a:rPr lang="en-US" sz="1200" dirty="0"/>
+              <a:t> { </a:t>
+            </a:r>
+            <a:r>
+              <a:rPr lang="en-US" sz="1200" dirty="0" err="1"/>
+              <a:t>trackID</a:t>
+            </a:r>
+            <a:r>
+              <a:rPr lang="en-US" sz="1200" dirty="0"/>
+              <a:t> } = await </a:t>
+            </a:r>
+            <a:r>
+              <a:rPr lang="en-US" sz="1200" dirty="0" err="1"/>
+              <a:t>g_db.get</a:t>
+            </a:r>
+            <a:r>
+              <a:rPr lang="en-US" sz="1200" dirty="0"/>
+              <a:t>("SELECT LAST_INSERT_ROWID() AS </a:t>
+            </a:r>
+            <a:r>
+              <a:rPr lang="en-US" sz="1200" dirty="0" err="1"/>
+              <a:t>trackID</a:t>
+            </a:r>
+            <a:r>
+              <a:rPr lang="en-US" sz="1200" dirty="0"/>
+              <a:t>");</a:t>
+            </a:r>
+            <a:endParaRPr lang="nl-NL" sz="1200" dirty="0"/>
           </a:p>
         </p:txBody>
       </p:sp>

</xml_diff>

<commit_message>
Added Maps functionalities and connected maps to dbase
</commit_message>
<xml_diff>
--- a/Overview_routes_dbase.pptx
+++ b/Overview_routes_dbase.pptx
@@ -3340,7 +3340,7 @@
         </p:nvSpPr>
         <p:spPr>
           <a:xfrm>
-            <a:off x="5767527" y="567008"/>
+            <a:off x="5767527" y="981789"/>
             <a:ext cx="1749641" cy="763480"/>
           </a:xfrm>
           <a:prstGeom prst="rect">
@@ -3397,7 +3397,7 @@
         </p:nvSpPr>
         <p:spPr>
           <a:xfrm>
-            <a:off x="5767527" y="1794961"/>
+            <a:off x="5767527" y="2209742"/>
             <a:ext cx="1749641" cy="763480"/>
           </a:xfrm>
           <a:prstGeom prst="rect">
@@ -3454,7 +3454,7 @@
         </p:nvSpPr>
         <p:spPr>
           <a:xfrm>
-            <a:off x="5767527" y="3047260"/>
+            <a:off x="5767527" y="3462041"/>
             <a:ext cx="1774056" cy="763480"/>
           </a:xfrm>
           <a:prstGeom prst="rect">
@@ -3519,7 +3519,7 @@
         </p:nvSpPr>
         <p:spPr>
           <a:xfrm>
-            <a:off x="5767527" y="4299559"/>
+            <a:off x="5767527" y="4714340"/>
             <a:ext cx="1774056" cy="763480"/>
           </a:xfrm>
           <a:prstGeom prst="rect">
@@ -3576,7 +3576,7 @@
         </p:nvSpPr>
         <p:spPr>
           <a:xfrm>
-            <a:off x="239697" y="1807134"/>
+            <a:off x="239697" y="2221915"/>
             <a:ext cx="1749641" cy="751307"/>
           </a:xfrm>
           <a:prstGeom prst="rect">
@@ -3637,7 +3637,7 @@
         </p:nvSpPr>
         <p:spPr>
           <a:xfrm>
-            <a:off x="227489" y="608404"/>
+            <a:off x="256109" y="4483232"/>
             <a:ext cx="1774056" cy="763480"/>
           </a:xfrm>
           <a:prstGeom prst="rect">
@@ -3698,7 +3698,7 @@
         </p:nvSpPr>
         <p:spPr>
           <a:xfrm>
-            <a:off x="2818104" y="5610266"/>
+            <a:off x="2818104" y="6025047"/>
             <a:ext cx="1774056" cy="763480"/>
           </a:xfrm>
           <a:prstGeom prst="rect">
@@ -3763,7 +3763,7 @@
         </p:nvSpPr>
         <p:spPr>
           <a:xfrm>
-            <a:off x="215282" y="3071794"/>
+            <a:off x="254862" y="3415713"/>
             <a:ext cx="1774056" cy="763480"/>
           </a:xfrm>
           <a:prstGeom prst="rect">
@@ -3829,7 +3829,7 @@
         </p:nvSpPr>
         <p:spPr>
           <a:xfrm>
-            <a:off x="5990209" y="197676"/>
+            <a:off x="5990209" y="612457"/>
             <a:ext cx="1526959" cy="369332"/>
           </a:xfrm>
           <a:prstGeom prst="rect">
@@ -3864,7 +3864,7 @@
         </p:nvSpPr>
         <p:spPr>
           <a:xfrm>
-            <a:off x="9065583" y="197676"/>
+            <a:off x="9065583" y="612457"/>
             <a:ext cx="3548847" cy="369332"/>
           </a:xfrm>
           <a:prstGeom prst="rect">
@@ -3919,7 +3919,7 @@
         </p:nvSpPr>
         <p:spPr>
           <a:xfrm>
-            <a:off x="9787080" y="657614"/>
+            <a:off x="9787080" y="1072395"/>
             <a:ext cx="1597609" cy="600023"/>
           </a:xfrm>
           <a:prstGeom prst="ellipse">
@@ -3969,7 +3969,7 @@
         </p:nvSpPr>
         <p:spPr>
           <a:xfrm>
-            <a:off x="9788189" y="1339365"/>
+            <a:off x="9788189" y="1754146"/>
             <a:ext cx="1597609" cy="600023"/>
           </a:xfrm>
           <a:prstGeom prst="ellipse">
@@ -4018,7 +4018,7 @@
         </p:nvSpPr>
         <p:spPr>
           <a:xfrm>
-            <a:off x="9787080" y="2046094"/>
+            <a:off x="9787080" y="2460875"/>
             <a:ext cx="1597608" cy="600023"/>
           </a:xfrm>
           <a:prstGeom prst="ellipse">
@@ -4067,7 +4067,7 @@
         </p:nvCxnSpPr>
         <p:spPr>
           <a:xfrm>
-            <a:off x="7669569" y="913063"/>
+            <a:off x="7669569" y="1327844"/>
             <a:ext cx="2015231" cy="0"/>
           </a:xfrm>
           <a:prstGeom prst="straightConnector1">
@@ -4106,7 +4106,7 @@
         </p:nvCxnSpPr>
         <p:spPr>
           <a:xfrm>
-            <a:off x="7687324" y="948573"/>
+            <a:off x="7687324" y="1363354"/>
             <a:ext cx="2099756" cy="656948"/>
           </a:xfrm>
           <a:prstGeom prst="straightConnector1">
@@ -4145,7 +4145,7 @@
         </p:nvCxnSpPr>
         <p:spPr>
           <a:xfrm>
-            <a:off x="7669569" y="967455"/>
+            <a:off x="7669569" y="1382236"/>
             <a:ext cx="2015231" cy="1388480"/>
           </a:xfrm>
           <a:prstGeom prst="straightConnector1">
@@ -4184,7 +4184,7 @@
         </p:nvSpPr>
         <p:spPr>
           <a:xfrm>
-            <a:off x="5878867" y="1437802"/>
+            <a:off x="5878867" y="1852583"/>
             <a:ext cx="1526959" cy="369332"/>
           </a:xfrm>
           <a:prstGeom prst="rect">
@@ -4223,7 +4223,7 @@
         </p:nvSpPr>
         <p:spPr>
           <a:xfrm>
-            <a:off x="5791942" y="2702462"/>
+            <a:off x="5791942" y="3117243"/>
             <a:ext cx="1749641" cy="369332"/>
           </a:xfrm>
           <a:prstGeom prst="rect">
@@ -4262,7 +4262,7 @@
         </p:nvSpPr>
         <p:spPr>
           <a:xfrm>
-            <a:off x="5919928" y="3910064"/>
+            <a:off x="5919928" y="4324845"/>
             <a:ext cx="1749641" cy="369332"/>
           </a:xfrm>
           <a:prstGeom prst="rect">
@@ -4297,7 +4297,7 @@
         </p:nvSpPr>
         <p:spPr>
           <a:xfrm>
-            <a:off x="5779734" y="5591979"/>
+            <a:off x="5779734" y="6006760"/>
             <a:ext cx="1774056" cy="763480"/>
           </a:xfrm>
           <a:prstGeom prst="rect">
@@ -4362,7 +4362,7 @@
         </p:nvSpPr>
         <p:spPr>
           <a:xfrm>
-            <a:off x="5779734" y="5142843"/>
+            <a:off x="5779734" y="5557624"/>
             <a:ext cx="1749641" cy="369332"/>
           </a:xfrm>
           <a:prstGeom prst="rect">
@@ -4401,7 +4401,7 @@
         </p:nvCxnSpPr>
         <p:spPr>
           <a:xfrm>
-            <a:off x="2173551" y="2166151"/>
+            <a:off x="2173551" y="2580932"/>
             <a:ext cx="3490587" cy="0"/>
           </a:xfrm>
           <a:prstGeom prst="straightConnector1">
@@ -4440,7 +4440,7 @@
         </p:nvCxnSpPr>
         <p:spPr>
           <a:xfrm>
-            <a:off x="2173551" y="2166151"/>
+            <a:off x="2173551" y="2580932"/>
             <a:ext cx="3490587" cy="1262849"/>
           </a:xfrm>
           <a:prstGeom prst="straightConnector1">
@@ -4479,7 +4479,7 @@
         </p:nvSpPr>
         <p:spPr>
           <a:xfrm>
-            <a:off x="3089614" y="2797575"/>
+            <a:off x="3089614" y="3212356"/>
             <a:ext cx="1999787" cy="276999"/>
           </a:xfrm>
           <a:prstGeom prst="rect">
@@ -4519,7 +4519,7 @@
         </p:nvCxnSpPr>
         <p:spPr>
           <a:xfrm flipH="1">
-            <a:off x="4758431" y="5973719"/>
+            <a:off x="4758431" y="6388500"/>
             <a:ext cx="905708" cy="0"/>
           </a:xfrm>
           <a:prstGeom prst="straightConnector1">
@@ -4558,7 +4558,7 @@
         </p:nvSpPr>
         <p:spPr>
           <a:xfrm>
-            <a:off x="4882718" y="6004414"/>
+            <a:off x="4882718" y="6419195"/>
             <a:ext cx="692459" cy="369332"/>
           </a:xfrm>
           <a:prstGeom prst="rect">
@@ -4593,7 +4593,7 @@
         </p:nvCxnSpPr>
         <p:spPr>
           <a:xfrm flipH="1" flipV="1">
-            <a:off x="2068497" y="2346105"/>
+            <a:off x="2068497" y="2760886"/>
             <a:ext cx="1636635" cy="3166070"/>
           </a:xfrm>
           <a:prstGeom prst="straightConnector1">
@@ -4632,7 +4632,7 @@
         </p:nvSpPr>
         <p:spPr>
           <a:xfrm>
-            <a:off x="2251968" y="4513104"/>
+            <a:off x="2251968" y="4927885"/>
             <a:ext cx="2630750" cy="646331"/>
           </a:xfrm>
           <a:prstGeom prst="rect">
@@ -4684,6 +4684,45 @@
           </a:p>
         </p:txBody>
       </p:sp>
+      <p:cxnSp>
+        <p:nvCxnSpPr>
+          <p:cNvPr id="16" name="Rechte verbindingslijn met pijl 15">
+            <a:extLst>
+              <a:ext uri="{FF2B5EF4-FFF2-40B4-BE49-F238E27FC236}">
+                <a16:creationId xmlns:a16="http://schemas.microsoft.com/office/drawing/2014/main" id="{7E95E828-6F67-4BB9-8D6C-DCF3AC3108BA}"/>
+              </a:ext>
+            </a:extLst>
+          </p:cNvPr>
+          <p:cNvCxnSpPr/>
+          <p:nvPr/>
+        </p:nvCxnSpPr>
+        <p:spPr>
+          <a:xfrm>
+            <a:off x="2251968" y="3843781"/>
+            <a:ext cx="3412170" cy="0"/>
+          </a:xfrm>
+          <a:prstGeom prst="straightConnector1">
+            <a:avLst/>
+          </a:prstGeom>
+          <a:ln>
+            <a:tailEnd type="triangle"/>
+          </a:ln>
+        </p:spPr>
+        <p:style>
+          <a:lnRef idx="1">
+            <a:schemeClr val="accent1"/>
+          </a:lnRef>
+          <a:fillRef idx="0">
+            <a:schemeClr val="accent1"/>
+          </a:fillRef>
+          <a:effectRef idx="0">
+            <a:schemeClr val="accent1"/>
+          </a:effectRef>
+          <a:fontRef idx="minor">
+            <a:schemeClr val="tx1"/>
+          </a:fontRef>
+        </p:style>
+      </p:cxnSp>
     </p:spTree>
     <p:extLst>
       <p:ext uri="{BB962C8B-B14F-4D97-AF65-F5344CB8AC3E}">

</xml_diff>